<commit_message>
finished lane geometry definition section
</commit_message>
<xml_diff>
--- a/resources/fig/umsetzung/U2/concept_lane_envelope.pptx
+++ b/resources/fig/umsetzung/U2/concept_lane_envelope.pptx
@@ -244,7 +244,7 @@
           <a:p>
             <a:fld id="{C7D908DB-A6BF-45EC-838E-C3658A186B89}" type="datetimeFigureOut">
               <a:rPr lang="de-DE" smtClean="0"/>
-              <a:t>15.11.2018</a:t>
+              <a:t>16.11.2018</a:t>
             </a:fld>
             <a:endParaRPr lang="de-DE"/>
           </a:p>
@@ -414,7 +414,7 @@
           <a:p>
             <a:fld id="{C7D908DB-A6BF-45EC-838E-C3658A186B89}" type="datetimeFigureOut">
               <a:rPr lang="de-DE" smtClean="0"/>
-              <a:t>15.11.2018</a:t>
+              <a:t>16.11.2018</a:t>
             </a:fld>
             <a:endParaRPr lang="de-DE"/>
           </a:p>
@@ -594,7 +594,7 @@
           <a:p>
             <a:fld id="{C7D908DB-A6BF-45EC-838E-C3658A186B89}" type="datetimeFigureOut">
               <a:rPr lang="de-DE" smtClean="0"/>
-              <a:t>15.11.2018</a:t>
+              <a:t>16.11.2018</a:t>
             </a:fld>
             <a:endParaRPr lang="de-DE"/>
           </a:p>
@@ -764,7 +764,7 @@
           <a:p>
             <a:fld id="{C7D908DB-A6BF-45EC-838E-C3658A186B89}" type="datetimeFigureOut">
               <a:rPr lang="de-DE" smtClean="0"/>
-              <a:t>15.11.2018</a:t>
+              <a:t>16.11.2018</a:t>
             </a:fld>
             <a:endParaRPr lang="de-DE"/>
           </a:p>
@@ -1010,7 +1010,7 @@
           <a:p>
             <a:fld id="{C7D908DB-A6BF-45EC-838E-C3658A186B89}" type="datetimeFigureOut">
               <a:rPr lang="de-DE" smtClean="0"/>
-              <a:t>15.11.2018</a:t>
+              <a:t>16.11.2018</a:t>
             </a:fld>
             <a:endParaRPr lang="de-DE"/>
           </a:p>
@@ -1242,7 +1242,7 @@
           <a:p>
             <a:fld id="{C7D908DB-A6BF-45EC-838E-C3658A186B89}" type="datetimeFigureOut">
               <a:rPr lang="de-DE" smtClean="0"/>
-              <a:t>15.11.2018</a:t>
+              <a:t>16.11.2018</a:t>
             </a:fld>
             <a:endParaRPr lang="de-DE"/>
           </a:p>
@@ -1609,7 +1609,7 @@
           <a:p>
             <a:fld id="{C7D908DB-A6BF-45EC-838E-C3658A186B89}" type="datetimeFigureOut">
               <a:rPr lang="de-DE" smtClean="0"/>
-              <a:t>15.11.2018</a:t>
+              <a:t>16.11.2018</a:t>
             </a:fld>
             <a:endParaRPr lang="de-DE"/>
           </a:p>
@@ -1727,7 +1727,7 @@
           <a:p>
             <a:fld id="{C7D908DB-A6BF-45EC-838E-C3658A186B89}" type="datetimeFigureOut">
               <a:rPr lang="de-DE" smtClean="0"/>
-              <a:t>15.11.2018</a:t>
+              <a:t>16.11.2018</a:t>
             </a:fld>
             <a:endParaRPr lang="de-DE"/>
           </a:p>
@@ -1822,7 +1822,7 @@
           <a:p>
             <a:fld id="{C7D908DB-A6BF-45EC-838E-C3658A186B89}" type="datetimeFigureOut">
               <a:rPr lang="de-DE" smtClean="0"/>
-              <a:t>15.11.2018</a:t>
+              <a:t>16.11.2018</a:t>
             </a:fld>
             <a:endParaRPr lang="de-DE"/>
           </a:p>
@@ -2099,7 +2099,7 @@
           <a:p>
             <a:fld id="{C7D908DB-A6BF-45EC-838E-C3658A186B89}" type="datetimeFigureOut">
               <a:rPr lang="de-DE" smtClean="0"/>
-              <a:t>15.11.2018</a:t>
+              <a:t>16.11.2018</a:t>
             </a:fld>
             <a:endParaRPr lang="de-DE"/>
           </a:p>
@@ -2352,7 +2352,7 @@
           <a:p>
             <a:fld id="{C7D908DB-A6BF-45EC-838E-C3658A186B89}" type="datetimeFigureOut">
               <a:rPr lang="de-DE" smtClean="0"/>
-              <a:t>15.11.2018</a:t>
+              <a:t>16.11.2018</a:t>
             </a:fld>
             <a:endParaRPr lang="de-DE"/>
           </a:p>
@@ -2565,7 +2565,7 @@
           <a:p>
             <a:fld id="{C7D908DB-A6BF-45EC-838E-C3658A186B89}" type="datetimeFigureOut">
               <a:rPr lang="de-DE" smtClean="0"/>
-              <a:t>15.11.2018</a:t>
+              <a:t>16.11.2018</a:t>
             </a:fld>
             <a:endParaRPr lang="de-DE"/>
           </a:p>
@@ -4537,7 +4537,7 @@
         </p:nvSpPr>
         <p:spPr>
           <a:xfrm>
-            <a:off x="5814732" y="3371530"/>
+            <a:off x="6142067" y="3334811"/>
             <a:ext cx="269310" cy="369332"/>
           </a:xfrm>
           <a:prstGeom prst="rect">
@@ -4952,6 +4952,132 @@
         <p:spPr>
           <a:xfrm>
             <a:off x="5282654" y="2596186"/>
+            <a:ext cx="554473" cy="369332"/>
+          </a:xfrm>
+          <a:prstGeom prst="rect">
+            <a:avLst/>
+          </a:prstGeom>
+          <a:noFill/>
+        </p:spPr>
+        <p:txBody>
+          <a:bodyPr wrap="square" rtlCol="0">
+            <a:spAutoFit/>
+          </a:bodyPr>
+          <a:lstStyle/>
+          <a:p>
+            <a:r>
+              <a:rPr lang="de-DE" b="1" i="1" dirty="0" err="1" smtClean="0">
+                <a:latin typeface="Calibri Light" panose="020F0302020204030204" pitchFamily="34" charset="0"/>
+                <a:cs typeface="Calibri Light" panose="020F0302020204030204" pitchFamily="34" charset="0"/>
+              </a:rPr>
+              <a:t>e_d</a:t>
+            </a:r>
+            <a:endParaRPr lang="de-DE" b="1" i="1" dirty="0">
+              <a:latin typeface="Calibri Light" panose="020F0302020204030204" pitchFamily="34" charset="0"/>
+              <a:cs typeface="Calibri Light" panose="020F0302020204030204" pitchFamily="34" charset="0"/>
+            </a:endParaRPr>
+          </a:p>
+        </p:txBody>
+      </p:sp>
+      <p:sp>
+        <p:nvSpPr>
+          <p:cNvPr id="17" name="Geschweifte Klammer rechts 16"/>
+          <p:cNvSpPr/>
+          <p:nvPr/>
+        </p:nvSpPr>
+        <p:spPr>
+          <a:xfrm rot="10800000">
+            <a:off x="5866290" y="3362302"/>
+            <a:ext cx="139342" cy="774000"/>
+          </a:xfrm>
+          <a:prstGeom prst="rightBrace">
+            <a:avLst/>
+          </a:prstGeom>
+        </p:spPr>
+        <p:style>
+          <a:lnRef idx="1">
+            <a:schemeClr val="dk1"/>
+          </a:lnRef>
+          <a:fillRef idx="0">
+            <a:schemeClr val="dk1"/>
+          </a:fillRef>
+          <a:effectRef idx="0">
+            <a:schemeClr val="dk1"/>
+          </a:effectRef>
+          <a:fontRef idx="minor">
+            <a:schemeClr val="tx1"/>
+          </a:fontRef>
+        </p:style>
+        <p:txBody>
+          <a:bodyPr rtlCol="0" anchor="ctr"/>
+          <a:lstStyle/>
+          <a:p>
+            <a:pPr algn="ctr"/>
+            <a:endParaRPr lang="de-DE"/>
+          </a:p>
+        </p:txBody>
+      </p:sp>
+      <p:sp>
+        <p:nvSpPr>
+          <p:cNvPr id="22" name="Ellipse 21"/>
+          <p:cNvSpPr/>
+          <p:nvPr/>
+        </p:nvSpPr>
+        <p:spPr>
+          <a:xfrm>
+            <a:off x="6077408" y="4076665"/>
+            <a:ext cx="118800" cy="113009"/>
+          </a:xfrm>
+          <a:prstGeom prst="ellipse">
+            <a:avLst/>
+          </a:prstGeom>
+          <a:solidFill>
+            <a:schemeClr val="bg1">
+              <a:lumMod val="50000"/>
+            </a:schemeClr>
+          </a:solidFill>
+          <a:ln>
+            <a:solidFill>
+              <a:schemeClr val="bg1">
+                <a:lumMod val="50000"/>
+              </a:schemeClr>
+            </a:solidFill>
+          </a:ln>
+        </p:spPr>
+        <p:style>
+          <a:lnRef idx="2">
+            <a:schemeClr val="dk1">
+              <a:shade val="50000"/>
+            </a:schemeClr>
+          </a:lnRef>
+          <a:fillRef idx="1">
+            <a:schemeClr val="dk1"/>
+          </a:fillRef>
+          <a:effectRef idx="0">
+            <a:schemeClr val="dk1"/>
+          </a:effectRef>
+          <a:fontRef idx="minor">
+            <a:schemeClr val="lt1"/>
+          </a:fontRef>
+        </p:style>
+        <p:txBody>
+          <a:bodyPr rtlCol="0" anchor="ctr"/>
+          <a:lstStyle/>
+          <a:p>
+            <a:pPr algn="ctr"/>
+            <a:endParaRPr lang="de-DE"/>
+          </a:p>
+        </p:txBody>
+      </p:sp>
+      <p:sp>
+        <p:nvSpPr>
+          <p:cNvPr id="23" name="Textfeld 22"/>
+          <p:cNvSpPr txBox="1"/>
+          <p:nvPr/>
+        </p:nvSpPr>
+        <p:spPr>
+          <a:xfrm>
+            <a:off x="5282654" y="3532077"/>
             <a:ext cx="554473" cy="369332"/>
           </a:xfrm>
           <a:prstGeom prst="rect">

</xml_diff>